<commit_message>
FINAL COMMIT code is as submitted on Moodle finally found out how to change project name in eclipse deleted some content
</commit_message>
<xml_diff>
--- a/diagramme_includes.pptx
+++ b/diagramme_includes.pptx
@@ -5100,13 +5100,13 @@
         </p:spPr>
         <p:style>
           <a:lnRef idx="2">
-            <a:schemeClr val="dk1"/>
+            <a:schemeClr val="accent2"/>
           </a:lnRef>
           <a:fillRef idx="0">
-            <a:schemeClr val="dk1"/>
+            <a:schemeClr val="accent2"/>
           </a:fillRef>
           <a:effectRef idx="1">
-            <a:schemeClr val="dk1"/>
+            <a:schemeClr val="accent2"/>
           </a:effectRef>
           <a:fontRef idx="minor">
             <a:schemeClr val="tx1"/>

</xml_diff>